<commit_message>
Added Salesforce Products slides
</commit_message>
<xml_diff>
--- a/Setup Guide.pptx
+++ b/Setup Guide.pptx
@@ -9,6 +9,9 @@
     <p:sldId id="257" r:id="rId3"/>
     <p:sldId id="258" r:id="rId4"/>
     <p:sldId id="259" r:id="rId5"/>
+    <p:sldId id="260" r:id="rId6"/>
+    <p:sldId id="261" r:id="rId7"/>
+    <p:sldId id="262" r:id="rId8"/>
   </p:sldIdLst>
   <p:sldSz cx="9144000" cy="6858000" type="screen4x3"/>
   <p:notesSz cx="6858000" cy="9144000"/>
@@ -320,7 +323,7 @@
           <a:p>
             <a:fld id="{9DBBD5C7-CE8D-4E67-AD9F-81D8ABE8F262}" type="datetimeFigureOut">
               <a:rPr lang="en-CA" smtClean="0"/>
-              <a:t>16/11/2016</a:t>
+              <a:t>17/11/2016</a:t>
             </a:fld>
             <a:endParaRPr lang="en-CA"/>
           </a:p>
@@ -506,7 +509,7 @@
           <a:p>
             <a:fld id="{9DBBD5C7-CE8D-4E67-AD9F-81D8ABE8F262}" type="datetimeFigureOut">
               <a:rPr lang="en-CA" smtClean="0"/>
-              <a:t>16/11/2016</a:t>
+              <a:t>17/11/2016</a:t>
             </a:fld>
             <a:endParaRPr lang="en-CA"/>
           </a:p>
@@ -688,7 +691,7 @@
           <a:p>
             <a:fld id="{9DBBD5C7-CE8D-4E67-AD9F-81D8ABE8F262}" type="datetimeFigureOut">
               <a:rPr lang="en-CA" smtClean="0"/>
-              <a:t>16/11/2016</a:t>
+              <a:t>17/11/2016</a:t>
             </a:fld>
             <a:endParaRPr lang="en-CA"/>
           </a:p>
@@ -881,7 +884,7 @@
           <a:p>
             <a:fld id="{9DBBD5C7-CE8D-4E67-AD9F-81D8ABE8F262}" type="datetimeFigureOut">
               <a:rPr lang="en-CA" smtClean="0"/>
-              <a:t>16/11/2016</a:t>
+              <a:t>17/11/2016</a:t>
             </a:fld>
             <a:endParaRPr lang="en-CA"/>
           </a:p>
@@ -1007,7 +1010,7 @@
           <a:p>
             <a:fld id="{9DBBD5C7-CE8D-4E67-AD9F-81D8ABE8F262}" type="datetimeFigureOut">
               <a:rPr lang="en-CA" smtClean="0"/>
-              <a:t>16/11/2016</a:t>
+              <a:t>17/11/2016</a:t>
             </a:fld>
             <a:endParaRPr lang="en-CA"/>
           </a:p>
@@ -1396,7 +1399,7 @@
           <a:p>
             <a:fld id="{9DBBD5C7-CE8D-4E67-AD9F-81D8ABE8F262}" type="datetimeFigureOut">
               <a:rPr lang="en-CA" smtClean="0"/>
-              <a:t>16/11/2016</a:t>
+              <a:t>17/11/2016</a:t>
             </a:fld>
             <a:endParaRPr lang="en-CA"/>
           </a:p>
@@ -1841,7 +1844,7 @@
           <a:p>
             <a:fld id="{9DBBD5C7-CE8D-4E67-AD9F-81D8ABE8F262}" type="datetimeFigureOut">
               <a:rPr lang="en-CA" smtClean="0"/>
-              <a:t>16/11/2016</a:t>
+              <a:t>17/11/2016</a:t>
             </a:fld>
             <a:endParaRPr lang="en-CA"/>
           </a:p>
@@ -1966,7 +1969,7 @@
           <a:p>
             <a:fld id="{9DBBD5C7-CE8D-4E67-AD9F-81D8ABE8F262}" type="datetimeFigureOut">
               <a:rPr lang="en-CA" smtClean="0"/>
-              <a:t>16/11/2016</a:t>
+              <a:t>17/11/2016</a:t>
             </a:fld>
             <a:endParaRPr lang="en-CA"/>
           </a:p>
@@ -2063,7 +2066,7 @@
           <a:p>
             <a:fld id="{9DBBD5C7-CE8D-4E67-AD9F-81D8ABE8F262}" type="datetimeFigureOut">
               <a:rPr lang="en-CA" smtClean="0"/>
-              <a:t>16/11/2016</a:t>
+              <a:t>17/11/2016</a:t>
             </a:fld>
             <a:endParaRPr lang="en-CA"/>
           </a:p>
@@ -2354,7 +2357,7 @@
           <a:p>
             <a:fld id="{9DBBD5C7-CE8D-4E67-AD9F-81D8ABE8F262}" type="datetimeFigureOut">
               <a:rPr lang="en-CA" smtClean="0"/>
-              <a:t>16/11/2016</a:t>
+              <a:t>17/11/2016</a:t>
             </a:fld>
             <a:endParaRPr lang="en-CA"/>
           </a:p>
@@ -2623,7 +2626,7 @@
           <a:p>
             <a:fld id="{9DBBD5C7-CE8D-4E67-AD9F-81D8ABE8F262}" type="datetimeFigureOut">
               <a:rPr lang="en-CA" smtClean="0"/>
-              <a:t>16/11/2016</a:t>
+              <a:t>17/11/2016</a:t>
             </a:fld>
             <a:endParaRPr lang="en-CA"/>
           </a:p>
@@ -2905,7 +2908,7 @@
           <a:p>
             <a:fld id="{9DBBD5C7-CE8D-4E67-AD9F-81D8ABE8F262}" type="datetimeFigureOut">
               <a:rPr lang="en-CA" smtClean="0"/>
-              <a:t>16/11/2016</a:t>
+              <a:t>17/11/2016</a:t>
             </a:fld>
             <a:endParaRPr lang="en-CA"/>
           </a:p>
@@ -4522,10 +4525,15 @@
             <p:ph sz="half" idx="2"/>
           </p:nvPr>
         </p:nvSpPr>
-        <p:spPr/>
+        <p:spPr>
+          <a:xfrm>
+            <a:off x="457200" y="675288"/>
+            <a:ext cx="3810000" cy="2525112"/>
+          </a:xfrm>
+        </p:spPr>
         <p:txBody>
           <a:bodyPr>
-            <a:normAutofit lnSpcReduction="10000"/>
+            <a:normAutofit fontScale="92500"/>
           </a:bodyPr>
           <a:lstStyle/>
           <a:p>
@@ -4542,8 +4550,12 @@
               <a:buNone/>
             </a:pPr>
             <a:r>
+              <a:rPr lang="en-CA" dirty="0" smtClean="0"/>
+              <a:t>            "</a:t>
+            </a:r>
+            <a:r>
               <a:rPr lang="en-CA" dirty="0"/>
-              <a:t>            "id": 1,</a:t>
+              <a:t>id": 1,</a:t>
             </a:r>
           </a:p>
           <a:p>
@@ -4555,12 +4567,12 @@
               <a:t>            "name": "</a:t>
             </a:r>
             <a:r>
-              <a:rPr lang="en-CA" dirty="0">
+              <a:rPr lang="en-CA" dirty="0" smtClean="0">
                 <a:solidFill>
                   <a:srgbClr val="FF0000"/>
                 </a:solidFill>
               </a:rPr>
-              <a:t>humira_gastro_uc_00</a:t>
+              <a:t>humira_gastro_content_grid_00</a:t>
             </a:r>
             <a:r>
               <a:rPr lang="en-CA" dirty="0"/>
@@ -4722,8 +4734,8 @@
         </p:nvSpPr>
         <p:spPr>
           <a:xfrm>
-            <a:off x="457199" y="3611562"/>
-            <a:ext cx="3581400" cy="2515198"/>
+            <a:off x="457198" y="3611562"/>
+            <a:ext cx="3810001" cy="2515198"/>
           </a:xfrm>
         </p:spPr>
         <p:txBody>
@@ -4808,16 +4820,21 @@
               <a:t>clm_presentation</a:t>
             </a:r>
             <a:r>
+              <a:rPr lang="en-CA" dirty="0" smtClean="0"/>
+              <a:t>":</a:t>
+            </a:r>
+          </a:p>
+          <a:p>
+            <a:pPr marL="45720" indent="0">
+              <a:buNone/>
+            </a:pPr>
+            <a:r>
+              <a:rPr lang="en-CA" dirty="0" smtClean="0"/>
+              <a:t>                  "abbvie_humira_gastro_content_grid_00</a:t>
+            </a:r>
+            <a:r>
               <a:rPr lang="en-CA" dirty="0"/>
-              <a:t>": </a:t>
-            </a:r>
-            <a:r>
-              <a:rPr lang="en-CA" dirty="0" smtClean="0"/>
-              <a:t>	"</a:t>
-            </a:r>
-            <a:r>
-              <a:rPr lang="en-CA" dirty="0"/>
-              <a:t>abbvie_humira_gastro_uc_00",</a:t>
+              <a:t>",</a:t>
             </a:r>
           </a:p>
           <a:p>
@@ -6788,6 +6805,1703 @@
     <p:extLst>
       <p:ext uri="{BB962C8B-B14F-4D97-AF65-F5344CB8AC3E}">
         <p14:creationId xmlns:p14="http://schemas.microsoft.com/office/powerpoint/2010/main" val="2161353399"/>
+      </p:ext>
+    </p:extLst>
+  </p:cSld>
+  <p:clrMapOvr>
+    <a:masterClrMapping/>
+  </p:clrMapOvr>
+  <p:timing>
+    <p:tnLst>
+      <p:par>
+        <p:cTn id="1" dur="indefinite" restart="never" nodeType="tmRoot"/>
+      </p:par>
+    </p:tnLst>
+  </p:timing>
+</p:sld>
+</file>
+
+<file path=ppt/slides/slide5.xml><?xml version="1.0" encoding="utf-8"?>
+<p:sld xmlns:a="http://schemas.openxmlformats.org/drawingml/2006/main" xmlns:r="http://schemas.openxmlformats.org/officeDocument/2006/relationships" xmlns:p="http://schemas.openxmlformats.org/presentationml/2006/main">
+  <p:cSld>
+    <p:spTree>
+      <p:nvGrpSpPr>
+        <p:cNvPr id="1" name=""/>
+        <p:cNvGrpSpPr/>
+        <p:nvPr/>
+      </p:nvGrpSpPr>
+      <p:grpSpPr>
+        <a:xfrm>
+          <a:off x="0" y="0"/>
+          <a:ext cx="0" cy="0"/>
+          <a:chOff x="0" y="0"/>
+          <a:chExt cx="0" cy="0"/>
+        </a:xfrm>
+      </p:grpSpPr>
+      <p:sp>
+        <p:nvSpPr>
+          <p:cNvPr id="7" name="TextBox 6"/>
+          <p:cNvSpPr txBox="1"/>
+          <p:nvPr/>
+        </p:nvSpPr>
+        <p:spPr>
+          <a:xfrm>
+            <a:off x="0" y="-68997"/>
+            <a:ext cx="9144000" cy="830997"/>
+          </a:xfrm>
+          <a:prstGeom prst="rect">
+            <a:avLst/>
+          </a:prstGeom>
+          <a:solidFill>
+            <a:schemeClr val="tx2">
+              <a:lumMod val="75000"/>
+            </a:schemeClr>
+          </a:solidFill>
+        </p:spPr>
+        <p:txBody>
+          <a:bodyPr wrap="square" rtlCol="0">
+            <a:spAutoFit/>
+          </a:bodyPr>
+          <a:lstStyle/>
+          <a:p>
+            <a:pPr algn="ctr"/>
+            <a:r>
+              <a:rPr lang="en-US" sz="4800" dirty="0" err="1" smtClean="0">
+                <a:solidFill>
+                  <a:schemeClr val="bg1"/>
+                </a:solidFill>
+              </a:rPr>
+              <a:t>SalesForce</a:t>
+            </a:r>
+            <a:r>
+              <a:rPr lang="en-US" sz="4800" dirty="0" smtClean="0">
+                <a:solidFill>
+                  <a:schemeClr val="bg1"/>
+                </a:solidFill>
+              </a:rPr>
+              <a:t> - Overview</a:t>
+            </a:r>
+            <a:endParaRPr lang="en-CA" sz="4800" dirty="0">
+              <a:solidFill>
+                <a:schemeClr val="bg1"/>
+              </a:solidFill>
+            </a:endParaRPr>
+          </a:p>
+        </p:txBody>
+      </p:sp>
+      <p:pic>
+        <p:nvPicPr>
+          <p:cNvPr id="10" name="Picture 9"/>
+          <p:cNvPicPr>
+            <a:picLocks noChangeAspect="1"/>
+          </p:cNvPicPr>
+          <p:nvPr/>
+        </p:nvPicPr>
+        <p:blipFill>
+          <a:blip r:embed="rId2">
+            <a:extLst>
+              <a:ext uri="{28A0092B-C50C-407E-A947-70E740481C1C}">
+                <a14:useLocalDpi xmlns:a14="http://schemas.microsoft.com/office/drawing/2010/main" val="0"/>
+              </a:ext>
+            </a:extLst>
+          </a:blip>
+          <a:stretch>
+            <a:fillRect/>
+          </a:stretch>
+        </p:blipFill>
+        <p:spPr>
+          <a:xfrm>
+            <a:off x="0" y="662299"/>
+            <a:ext cx="9144000" cy="6195701"/>
+          </a:xfrm>
+          <a:prstGeom prst="rect">
+            <a:avLst/>
+          </a:prstGeom>
+        </p:spPr>
+      </p:pic>
+      <p:sp>
+        <p:nvSpPr>
+          <p:cNvPr id="11" name="Rectangle 10"/>
+          <p:cNvSpPr/>
+          <p:nvPr/>
+        </p:nvSpPr>
+        <p:spPr>
+          <a:xfrm>
+            <a:off x="2971800" y="1881855"/>
+            <a:ext cx="762000" cy="228600"/>
+          </a:xfrm>
+          <a:prstGeom prst="rect">
+            <a:avLst/>
+          </a:prstGeom>
+          <a:noFill/>
+          <a:ln>
+            <a:solidFill>
+              <a:srgbClr val="FF0000"/>
+            </a:solidFill>
+          </a:ln>
+        </p:spPr>
+        <p:style>
+          <a:lnRef idx="2">
+            <a:schemeClr val="accent1">
+              <a:shade val="50000"/>
+            </a:schemeClr>
+          </a:lnRef>
+          <a:fillRef idx="1">
+            <a:schemeClr val="accent1"/>
+          </a:fillRef>
+          <a:effectRef idx="0">
+            <a:schemeClr val="accent1"/>
+          </a:effectRef>
+          <a:fontRef idx="minor">
+            <a:schemeClr val="lt1"/>
+          </a:fontRef>
+        </p:style>
+        <p:txBody>
+          <a:bodyPr rtlCol="0" anchor="ctr"/>
+          <a:lstStyle/>
+          <a:p>
+            <a:pPr algn="ctr"/>
+            <a:endParaRPr lang="en-CA"/>
+          </a:p>
+        </p:txBody>
+      </p:sp>
+      <p:sp>
+        <p:nvSpPr>
+          <p:cNvPr id="12" name="Rectangle 11"/>
+          <p:cNvSpPr/>
+          <p:nvPr/>
+        </p:nvSpPr>
+        <p:spPr>
+          <a:xfrm>
+            <a:off x="3810000" y="1881855"/>
+            <a:ext cx="914400" cy="228600"/>
+          </a:xfrm>
+          <a:prstGeom prst="rect">
+            <a:avLst/>
+          </a:prstGeom>
+          <a:noFill/>
+          <a:ln>
+            <a:solidFill>
+              <a:srgbClr val="FF0000"/>
+            </a:solidFill>
+          </a:ln>
+        </p:spPr>
+        <p:style>
+          <a:lnRef idx="2">
+            <a:schemeClr val="accent1">
+              <a:shade val="50000"/>
+            </a:schemeClr>
+          </a:lnRef>
+          <a:fillRef idx="1">
+            <a:schemeClr val="accent1"/>
+          </a:fillRef>
+          <a:effectRef idx="0">
+            <a:schemeClr val="accent1"/>
+          </a:effectRef>
+          <a:fontRef idx="minor">
+            <a:schemeClr val="lt1"/>
+          </a:fontRef>
+        </p:style>
+        <p:txBody>
+          <a:bodyPr rtlCol="0" anchor="ctr"/>
+          <a:lstStyle/>
+          <a:p>
+            <a:pPr algn="ctr"/>
+            <a:endParaRPr lang="en-CA"/>
+          </a:p>
+        </p:txBody>
+      </p:sp>
+      <p:sp>
+        <p:nvSpPr>
+          <p:cNvPr id="13" name="Rectangle 12"/>
+          <p:cNvSpPr/>
+          <p:nvPr/>
+        </p:nvSpPr>
+        <p:spPr>
+          <a:xfrm>
+            <a:off x="5257800" y="1880074"/>
+            <a:ext cx="914400" cy="228600"/>
+          </a:xfrm>
+          <a:prstGeom prst="rect">
+            <a:avLst/>
+          </a:prstGeom>
+          <a:noFill/>
+          <a:ln>
+            <a:solidFill>
+              <a:srgbClr val="FF0000"/>
+            </a:solidFill>
+          </a:ln>
+        </p:spPr>
+        <p:style>
+          <a:lnRef idx="2">
+            <a:schemeClr val="accent1">
+              <a:shade val="50000"/>
+            </a:schemeClr>
+          </a:lnRef>
+          <a:fillRef idx="1">
+            <a:schemeClr val="accent1"/>
+          </a:fillRef>
+          <a:effectRef idx="0">
+            <a:schemeClr val="accent1"/>
+          </a:effectRef>
+          <a:fontRef idx="minor">
+            <a:schemeClr val="lt1"/>
+          </a:fontRef>
+        </p:style>
+        <p:txBody>
+          <a:bodyPr rtlCol="0" anchor="ctr"/>
+          <a:lstStyle/>
+          <a:p>
+            <a:pPr algn="ctr"/>
+            <a:endParaRPr lang="en-CA"/>
+          </a:p>
+        </p:txBody>
+      </p:sp>
+      <p:sp>
+        <p:nvSpPr>
+          <p:cNvPr id="14" name="Oval 13"/>
+          <p:cNvSpPr/>
+          <p:nvPr/>
+        </p:nvSpPr>
+        <p:spPr>
+          <a:xfrm>
+            <a:off x="7670207" y="1895029"/>
+            <a:ext cx="228600" cy="215426"/>
+          </a:xfrm>
+          <a:prstGeom prst="ellipse">
+            <a:avLst/>
+          </a:prstGeom>
+          <a:noFill/>
+          <a:ln>
+            <a:solidFill>
+              <a:schemeClr val="accent1">
+                <a:lumMod val="75000"/>
+              </a:schemeClr>
+            </a:solidFill>
+          </a:ln>
+        </p:spPr>
+        <p:style>
+          <a:lnRef idx="2">
+            <a:schemeClr val="accent1">
+              <a:shade val="50000"/>
+            </a:schemeClr>
+          </a:lnRef>
+          <a:fillRef idx="1">
+            <a:schemeClr val="accent1"/>
+          </a:fillRef>
+          <a:effectRef idx="0">
+            <a:schemeClr val="accent1"/>
+          </a:effectRef>
+          <a:fontRef idx="minor">
+            <a:schemeClr val="lt1"/>
+          </a:fontRef>
+        </p:style>
+        <p:txBody>
+          <a:bodyPr rtlCol="0" anchor="ctr"/>
+          <a:lstStyle/>
+          <a:p>
+            <a:pPr algn="ctr"/>
+            <a:endParaRPr lang="en-CA"/>
+          </a:p>
+        </p:txBody>
+      </p:sp>
+      <p:cxnSp>
+        <p:nvCxnSpPr>
+          <p:cNvPr id="16" name="Straight Connector 15"/>
+          <p:cNvCxnSpPr/>
+          <p:nvPr/>
+        </p:nvCxnSpPr>
+        <p:spPr>
+          <a:xfrm flipH="1">
+            <a:off x="2514600" y="2110455"/>
+            <a:ext cx="838200" cy="1470945"/>
+          </a:xfrm>
+          <a:prstGeom prst="line">
+            <a:avLst/>
+          </a:prstGeom>
+          <a:ln w="19050">
+            <a:solidFill>
+              <a:srgbClr val="F03030"/>
+            </a:solidFill>
+          </a:ln>
+        </p:spPr>
+        <p:style>
+          <a:lnRef idx="1">
+            <a:schemeClr val="accent1"/>
+          </a:lnRef>
+          <a:fillRef idx="0">
+            <a:schemeClr val="accent1"/>
+          </a:fillRef>
+          <a:effectRef idx="0">
+            <a:schemeClr val="accent1"/>
+          </a:effectRef>
+          <a:fontRef idx="minor">
+            <a:schemeClr val="tx1"/>
+          </a:fontRef>
+        </p:style>
+      </p:cxnSp>
+      <p:sp>
+        <p:nvSpPr>
+          <p:cNvPr id="17" name="TextBox 16"/>
+          <p:cNvSpPr txBox="1"/>
+          <p:nvPr/>
+        </p:nvSpPr>
+        <p:spPr>
+          <a:xfrm>
+            <a:off x="1524000" y="3589945"/>
+            <a:ext cx="1676400" cy="923330"/>
+          </a:xfrm>
+          <a:prstGeom prst="rect">
+            <a:avLst/>
+          </a:prstGeom>
+          <a:solidFill>
+            <a:schemeClr val="tx2">
+              <a:lumMod val="75000"/>
+            </a:schemeClr>
+          </a:solidFill>
+          <a:ln w="19050">
+            <a:solidFill>
+              <a:srgbClr val="F03030"/>
+            </a:solidFill>
+          </a:ln>
+        </p:spPr>
+        <p:txBody>
+          <a:bodyPr wrap="square" rtlCol="0">
+            <a:spAutoFit/>
+          </a:bodyPr>
+          <a:lstStyle/>
+          <a:p>
+            <a:pPr algn="ctr"/>
+            <a:r>
+              <a:rPr lang="en-US" dirty="0" smtClean="0">
+                <a:solidFill>
+                  <a:schemeClr val="bg1"/>
+                </a:solidFill>
+              </a:rPr>
+              <a:t>This is where </a:t>
+            </a:r>
+            <a:r>
+              <a:rPr lang="en-US" dirty="0" err="1" smtClean="0">
+                <a:solidFill>
+                  <a:schemeClr val="bg1"/>
+                </a:solidFill>
+              </a:rPr>
+              <a:t>SmartRep</a:t>
+            </a:r>
+            <a:r>
+              <a:rPr lang="en-US" dirty="0" smtClean="0">
+                <a:solidFill>
+                  <a:schemeClr val="bg1"/>
+                </a:solidFill>
+              </a:rPr>
+              <a:t> sends our Slides</a:t>
+            </a:r>
+            <a:endParaRPr lang="en-CA" dirty="0">
+              <a:solidFill>
+                <a:schemeClr val="bg1"/>
+              </a:solidFill>
+            </a:endParaRPr>
+          </a:p>
+        </p:txBody>
+      </p:sp>
+      <p:sp>
+        <p:nvSpPr>
+          <p:cNvPr id="18" name="TextBox 17"/>
+          <p:cNvSpPr txBox="1"/>
+          <p:nvPr/>
+        </p:nvSpPr>
+        <p:spPr>
+          <a:xfrm>
+            <a:off x="3505200" y="3589945"/>
+            <a:ext cx="1676400" cy="1200329"/>
+          </a:xfrm>
+          <a:prstGeom prst="rect">
+            <a:avLst/>
+          </a:prstGeom>
+          <a:solidFill>
+            <a:schemeClr val="tx2">
+              <a:lumMod val="75000"/>
+            </a:schemeClr>
+          </a:solidFill>
+          <a:ln w="19050">
+            <a:solidFill>
+              <a:srgbClr val="F03030"/>
+            </a:solidFill>
+          </a:ln>
+        </p:spPr>
+        <p:txBody>
+          <a:bodyPr wrap="square" rtlCol="0">
+            <a:spAutoFit/>
+          </a:bodyPr>
+          <a:lstStyle/>
+          <a:p>
+            <a:pPr algn="ctr"/>
+            <a:r>
+              <a:rPr lang="en-US" dirty="0" smtClean="0">
+                <a:solidFill>
+                  <a:schemeClr val="bg1"/>
+                </a:solidFill>
+              </a:rPr>
+              <a:t>This is where we need to set up the presentation</a:t>
+            </a:r>
+            <a:endParaRPr lang="en-CA" dirty="0">
+              <a:solidFill>
+                <a:schemeClr val="bg1"/>
+              </a:solidFill>
+            </a:endParaRPr>
+          </a:p>
+        </p:txBody>
+      </p:sp>
+      <p:cxnSp>
+        <p:nvCxnSpPr>
+          <p:cNvPr id="21" name="Straight Connector 20"/>
+          <p:cNvCxnSpPr>
+            <a:stCxn id="12" idx="2"/>
+          </p:cNvCxnSpPr>
+          <p:nvPr/>
+        </p:nvCxnSpPr>
+        <p:spPr>
+          <a:xfrm>
+            <a:off x="4267200" y="2110455"/>
+            <a:ext cx="0" cy="1470945"/>
+          </a:xfrm>
+          <a:prstGeom prst="line">
+            <a:avLst/>
+          </a:prstGeom>
+          <a:ln w="19050">
+            <a:solidFill>
+              <a:srgbClr val="FF0000"/>
+            </a:solidFill>
+          </a:ln>
+        </p:spPr>
+        <p:style>
+          <a:lnRef idx="1">
+            <a:schemeClr val="accent1"/>
+          </a:lnRef>
+          <a:fillRef idx="0">
+            <a:schemeClr val="accent1"/>
+          </a:fillRef>
+          <a:effectRef idx="0">
+            <a:schemeClr val="accent1"/>
+          </a:effectRef>
+          <a:fontRef idx="minor">
+            <a:schemeClr val="tx1"/>
+          </a:fontRef>
+        </p:style>
+      </p:cxnSp>
+      <p:cxnSp>
+        <p:nvCxnSpPr>
+          <p:cNvPr id="22" name="Straight Connector 21"/>
+          <p:cNvCxnSpPr/>
+          <p:nvPr/>
+        </p:nvCxnSpPr>
+        <p:spPr>
+          <a:xfrm>
+            <a:off x="5724970" y="2119000"/>
+            <a:ext cx="371030" cy="1538600"/>
+          </a:xfrm>
+          <a:prstGeom prst="line">
+            <a:avLst/>
+          </a:prstGeom>
+          <a:ln w="19050">
+            <a:solidFill>
+              <a:srgbClr val="FF0000"/>
+            </a:solidFill>
+          </a:ln>
+        </p:spPr>
+        <p:style>
+          <a:lnRef idx="1">
+            <a:schemeClr val="accent1"/>
+          </a:lnRef>
+          <a:fillRef idx="0">
+            <a:schemeClr val="accent1"/>
+          </a:fillRef>
+          <a:effectRef idx="0">
+            <a:schemeClr val="accent1"/>
+          </a:effectRef>
+          <a:fontRef idx="minor">
+            <a:schemeClr val="tx1"/>
+          </a:fontRef>
+        </p:style>
+      </p:cxnSp>
+      <p:sp>
+        <p:nvSpPr>
+          <p:cNvPr id="24" name="TextBox 23"/>
+          <p:cNvSpPr txBox="1"/>
+          <p:nvPr/>
+        </p:nvSpPr>
+        <p:spPr>
+          <a:xfrm>
+            <a:off x="5410200" y="3657600"/>
+            <a:ext cx="1676400" cy="1200329"/>
+          </a:xfrm>
+          <a:prstGeom prst="rect">
+            <a:avLst/>
+          </a:prstGeom>
+          <a:solidFill>
+            <a:schemeClr val="tx2">
+              <a:lumMod val="75000"/>
+            </a:schemeClr>
+          </a:solidFill>
+          <a:ln w="19050">
+            <a:solidFill>
+              <a:srgbClr val="F03030"/>
+            </a:solidFill>
+          </a:ln>
+        </p:spPr>
+        <p:txBody>
+          <a:bodyPr wrap="square" rtlCol="0">
+            <a:spAutoFit/>
+          </a:bodyPr>
+          <a:lstStyle/>
+          <a:p>
+            <a:pPr algn="ctr"/>
+            <a:r>
+              <a:rPr lang="en-US" dirty="0" smtClean="0">
+                <a:solidFill>
+                  <a:schemeClr val="bg1"/>
+                </a:solidFill>
+              </a:rPr>
+              <a:t>And this is where we set up the product for the ISA</a:t>
+            </a:r>
+            <a:endParaRPr lang="en-CA" dirty="0">
+              <a:solidFill>
+                <a:schemeClr val="bg1"/>
+              </a:solidFill>
+            </a:endParaRPr>
+          </a:p>
+        </p:txBody>
+      </p:sp>
+      <p:cxnSp>
+        <p:nvCxnSpPr>
+          <p:cNvPr id="25" name="Straight Connector 24"/>
+          <p:cNvCxnSpPr/>
+          <p:nvPr/>
+        </p:nvCxnSpPr>
+        <p:spPr>
+          <a:xfrm>
+            <a:off x="7820827" y="2119000"/>
+            <a:ext cx="371030" cy="1538600"/>
+          </a:xfrm>
+          <a:prstGeom prst="line">
+            <a:avLst/>
+          </a:prstGeom>
+          <a:ln w="19050">
+            <a:solidFill>
+              <a:schemeClr val="accent1">
+                <a:lumMod val="75000"/>
+              </a:schemeClr>
+            </a:solidFill>
+          </a:ln>
+        </p:spPr>
+        <p:style>
+          <a:lnRef idx="1">
+            <a:schemeClr val="accent1"/>
+          </a:lnRef>
+          <a:fillRef idx="0">
+            <a:schemeClr val="accent1"/>
+          </a:fillRef>
+          <a:effectRef idx="0">
+            <a:schemeClr val="accent1"/>
+          </a:effectRef>
+          <a:fontRef idx="minor">
+            <a:schemeClr val="tx1"/>
+          </a:fontRef>
+        </p:style>
+      </p:cxnSp>
+      <p:sp>
+        <p:nvSpPr>
+          <p:cNvPr id="26" name="TextBox 25"/>
+          <p:cNvSpPr txBox="1"/>
+          <p:nvPr/>
+        </p:nvSpPr>
+        <p:spPr>
+          <a:xfrm>
+            <a:off x="7256804" y="3657599"/>
+            <a:ext cx="1676400" cy="1200329"/>
+          </a:xfrm>
+          <a:prstGeom prst="rect">
+            <a:avLst/>
+          </a:prstGeom>
+          <a:solidFill>
+            <a:schemeClr val="tx2">
+              <a:lumMod val="75000"/>
+            </a:schemeClr>
+          </a:solidFill>
+          <a:ln w="19050">
+            <a:solidFill>
+              <a:schemeClr val="accent1">
+                <a:lumMod val="75000"/>
+              </a:schemeClr>
+            </a:solidFill>
+          </a:ln>
+        </p:spPr>
+        <p:txBody>
+          <a:bodyPr wrap="square" rtlCol="0">
+            <a:spAutoFit/>
+          </a:bodyPr>
+          <a:lstStyle/>
+          <a:p>
+            <a:pPr algn="ctr"/>
+            <a:r>
+              <a:rPr lang="en-US" dirty="0" smtClean="0">
+                <a:solidFill>
+                  <a:schemeClr val="bg1"/>
+                </a:solidFill>
+              </a:rPr>
+              <a:t>If you don’t see these tabs, click here for the full tab list!</a:t>
+            </a:r>
+            <a:endParaRPr lang="en-CA" dirty="0">
+              <a:solidFill>
+                <a:schemeClr val="bg1"/>
+              </a:solidFill>
+            </a:endParaRPr>
+          </a:p>
+        </p:txBody>
+      </p:sp>
+    </p:spTree>
+    <p:extLst>
+      <p:ext uri="{BB962C8B-B14F-4D97-AF65-F5344CB8AC3E}">
+        <p14:creationId xmlns:p14="http://schemas.microsoft.com/office/powerpoint/2010/main" val="572696621"/>
+      </p:ext>
+    </p:extLst>
+  </p:cSld>
+  <p:clrMapOvr>
+    <a:masterClrMapping/>
+  </p:clrMapOvr>
+  <p:timing>
+    <p:tnLst>
+      <p:par>
+        <p:cTn id="1" dur="indefinite" restart="never" nodeType="tmRoot"/>
+      </p:par>
+    </p:tnLst>
+  </p:timing>
+</p:sld>
+</file>
+
+<file path=ppt/slides/slide6.xml><?xml version="1.0" encoding="utf-8"?>
+<p:sld xmlns:a="http://schemas.openxmlformats.org/drawingml/2006/main" xmlns:r="http://schemas.openxmlformats.org/officeDocument/2006/relationships" xmlns:p="http://schemas.openxmlformats.org/presentationml/2006/main">
+  <p:cSld>
+    <p:spTree>
+      <p:nvGrpSpPr>
+        <p:cNvPr id="1" name=""/>
+        <p:cNvGrpSpPr/>
+        <p:nvPr/>
+      </p:nvGrpSpPr>
+      <p:grpSpPr>
+        <a:xfrm>
+          <a:off x="0" y="0"/>
+          <a:ext cx="0" cy="0"/>
+          <a:chOff x="0" y="0"/>
+          <a:chExt cx="0" cy="0"/>
+        </a:xfrm>
+      </p:grpSpPr>
+      <p:sp>
+        <p:nvSpPr>
+          <p:cNvPr id="7" name="TextBox 6"/>
+          <p:cNvSpPr txBox="1"/>
+          <p:nvPr/>
+        </p:nvSpPr>
+        <p:spPr>
+          <a:xfrm>
+            <a:off x="0" y="-68997"/>
+            <a:ext cx="9144000" cy="830997"/>
+          </a:xfrm>
+          <a:prstGeom prst="rect">
+            <a:avLst/>
+          </a:prstGeom>
+          <a:solidFill>
+            <a:schemeClr val="tx2">
+              <a:lumMod val="75000"/>
+            </a:schemeClr>
+          </a:solidFill>
+        </p:spPr>
+        <p:txBody>
+          <a:bodyPr wrap="square" rtlCol="0">
+            <a:spAutoFit/>
+          </a:bodyPr>
+          <a:lstStyle/>
+          <a:p>
+            <a:pPr algn="ctr"/>
+            <a:r>
+              <a:rPr lang="en-US" sz="4800" dirty="0" err="1" smtClean="0">
+                <a:solidFill>
+                  <a:schemeClr val="bg1"/>
+                </a:solidFill>
+              </a:rPr>
+              <a:t>SalesForce</a:t>
+            </a:r>
+            <a:r>
+              <a:rPr lang="en-US" sz="4800" dirty="0" smtClean="0">
+                <a:solidFill>
+                  <a:schemeClr val="bg1"/>
+                </a:solidFill>
+              </a:rPr>
+              <a:t> – Product ID</a:t>
+            </a:r>
+            <a:endParaRPr lang="en-CA" sz="4800" dirty="0">
+              <a:solidFill>
+                <a:schemeClr val="bg1"/>
+              </a:solidFill>
+            </a:endParaRPr>
+          </a:p>
+        </p:txBody>
+      </p:sp>
+      <p:pic>
+        <p:nvPicPr>
+          <p:cNvPr id="2" name="Picture 1"/>
+          <p:cNvPicPr>
+            <a:picLocks noChangeAspect="1"/>
+          </p:cNvPicPr>
+          <p:nvPr/>
+        </p:nvPicPr>
+        <p:blipFill>
+          <a:blip r:embed="rId2">
+            <a:extLst>
+              <a:ext uri="{28A0092B-C50C-407E-A947-70E740481C1C}">
+                <a14:useLocalDpi xmlns:a14="http://schemas.microsoft.com/office/drawing/2010/main" val="0"/>
+              </a:ext>
+            </a:extLst>
+          </a:blip>
+          <a:stretch>
+            <a:fillRect/>
+          </a:stretch>
+        </p:blipFill>
+        <p:spPr>
+          <a:xfrm>
+            <a:off x="0" y="685800"/>
+            <a:ext cx="9144000" cy="6169784"/>
+          </a:xfrm>
+          <a:prstGeom prst="rect">
+            <a:avLst/>
+          </a:prstGeom>
+        </p:spPr>
+      </p:pic>
+      <p:sp>
+        <p:nvSpPr>
+          <p:cNvPr id="19" name="Rectangle 18"/>
+          <p:cNvSpPr/>
+          <p:nvPr/>
+        </p:nvSpPr>
+        <p:spPr>
+          <a:xfrm>
+            <a:off x="1828800" y="3587886"/>
+            <a:ext cx="1066800" cy="228600"/>
+          </a:xfrm>
+          <a:prstGeom prst="rect">
+            <a:avLst/>
+          </a:prstGeom>
+          <a:noFill/>
+          <a:ln>
+            <a:solidFill>
+              <a:srgbClr val="FF0000"/>
+            </a:solidFill>
+          </a:ln>
+        </p:spPr>
+        <p:style>
+          <a:lnRef idx="2">
+            <a:schemeClr val="accent1">
+              <a:shade val="50000"/>
+            </a:schemeClr>
+          </a:lnRef>
+          <a:fillRef idx="1">
+            <a:schemeClr val="accent1"/>
+          </a:fillRef>
+          <a:effectRef idx="0">
+            <a:schemeClr val="accent1"/>
+          </a:effectRef>
+          <a:fontRef idx="minor">
+            <a:schemeClr val="lt1"/>
+          </a:fontRef>
+        </p:style>
+        <p:txBody>
+          <a:bodyPr rtlCol="0" anchor="ctr"/>
+          <a:lstStyle/>
+          <a:p>
+            <a:pPr algn="ctr"/>
+            <a:endParaRPr lang="en-CA"/>
+          </a:p>
+        </p:txBody>
+      </p:sp>
+      <p:sp>
+        <p:nvSpPr>
+          <p:cNvPr id="20" name="TextBox 19"/>
+          <p:cNvSpPr txBox="1"/>
+          <p:nvPr/>
+        </p:nvSpPr>
+        <p:spPr>
+          <a:xfrm>
+            <a:off x="150620" y="4571321"/>
+            <a:ext cx="2819400" cy="923330"/>
+          </a:xfrm>
+          <a:prstGeom prst="rect">
+            <a:avLst/>
+          </a:prstGeom>
+          <a:solidFill>
+            <a:schemeClr val="tx2">
+              <a:lumMod val="75000"/>
+            </a:schemeClr>
+          </a:solidFill>
+          <a:ln w="19050">
+            <a:solidFill>
+              <a:srgbClr val="F03030"/>
+            </a:solidFill>
+          </a:ln>
+        </p:spPr>
+        <p:txBody>
+          <a:bodyPr wrap="square" rtlCol="0">
+            <a:spAutoFit/>
+          </a:bodyPr>
+          <a:lstStyle/>
+          <a:p>
+            <a:pPr algn="ctr"/>
+            <a:r>
+              <a:rPr lang="en-US" dirty="0" smtClean="0">
+                <a:solidFill>
+                  <a:schemeClr val="bg1"/>
+                </a:solidFill>
+              </a:rPr>
+              <a:t>To find the product ID, click the product you want to use to open it’s details page.</a:t>
+            </a:r>
+            <a:endParaRPr lang="en-CA" dirty="0">
+              <a:solidFill>
+                <a:schemeClr val="bg1"/>
+              </a:solidFill>
+            </a:endParaRPr>
+          </a:p>
+        </p:txBody>
+      </p:sp>
+      <p:cxnSp>
+        <p:nvCxnSpPr>
+          <p:cNvPr id="23" name="Straight Connector 22"/>
+          <p:cNvCxnSpPr/>
+          <p:nvPr/>
+        </p:nvCxnSpPr>
+        <p:spPr>
+          <a:xfrm flipV="1">
+            <a:off x="1560320" y="3816486"/>
+            <a:ext cx="801880" cy="754835"/>
+          </a:xfrm>
+          <a:prstGeom prst="line">
+            <a:avLst/>
+          </a:prstGeom>
+          <a:ln w="19050">
+            <a:solidFill>
+              <a:srgbClr val="F03030"/>
+            </a:solidFill>
+          </a:ln>
+        </p:spPr>
+        <p:style>
+          <a:lnRef idx="1">
+            <a:schemeClr val="accent1"/>
+          </a:lnRef>
+          <a:fillRef idx="0">
+            <a:schemeClr val="accent1"/>
+          </a:fillRef>
+          <a:effectRef idx="0">
+            <a:schemeClr val="accent1"/>
+          </a:effectRef>
+          <a:fontRef idx="minor">
+            <a:schemeClr val="tx1"/>
+          </a:fontRef>
+        </p:style>
+      </p:cxnSp>
+      <p:pic>
+        <p:nvPicPr>
+          <p:cNvPr id="5" name="Picture 4"/>
+          <p:cNvPicPr>
+            <a:picLocks noChangeAspect="1"/>
+          </p:cNvPicPr>
+          <p:nvPr/>
+        </p:nvPicPr>
+        <p:blipFill>
+          <a:blip r:embed="rId3">
+            <a:extLst>
+              <a:ext uri="{28A0092B-C50C-407E-A947-70E740481C1C}">
+                <a14:useLocalDpi xmlns:a14="http://schemas.microsoft.com/office/drawing/2010/main" val="0"/>
+              </a:ext>
+            </a:extLst>
+          </a:blip>
+          <a:stretch>
+            <a:fillRect/>
+          </a:stretch>
+        </p:blipFill>
+        <p:spPr>
+          <a:xfrm>
+            <a:off x="4688080" y="3332197"/>
+            <a:ext cx="4419600" cy="3500849"/>
+          </a:xfrm>
+          <a:prstGeom prst="rect">
+            <a:avLst/>
+          </a:prstGeom>
+          <a:ln w="28575">
+            <a:solidFill>
+              <a:srgbClr val="7030A0"/>
+            </a:solidFill>
+          </a:ln>
+        </p:spPr>
+      </p:pic>
+      <p:sp>
+        <p:nvSpPr>
+          <p:cNvPr id="27" name="Rectangle 26"/>
+          <p:cNvSpPr/>
+          <p:nvPr/>
+        </p:nvSpPr>
+        <p:spPr>
+          <a:xfrm>
+            <a:off x="6477000" y="3587886"/>
+            <a:ext cx="1066800" cy="228600"/>
+          </a:xfrm>
+          <a:prstGeom prst="rect">
+            <a:avLst/>
+          </a:prstGeom>
+          <a:noFill/>
+          <a:ln>
+            <a:solidFill>
+              <a:srgbClr val="FF0000"/>
+            </a:solidFill>
+          </a:ln>
+        </p:spPr>
+        <p:style>
+          <a:lnRef idx="2">
+            <a:schemeClr val="accent1">
+              <a:shade val="50000"/>
+            </a:schemeClr>
+          </a:lnRef>
+          <a:fillRef idx="1">
+            <a:schemeClr val="accent1"/>
+          </a:fillRef>
+          <a:effectRef idx="0">
+            <a:schemeClr val="accent1"/>
+          </a:effectRef>
+          <a:fontRef idx="minor">
+            <a:schemeClr val="lt1"/>
+          </a:fontRef>
+        </p:style>
+        <p:txBody>
+          <a:bodyPr rtlCol="0" anchor="ctr"/>
+          <a:lstStyle/>
+          <a:p>
+            <a:pPr algn="ctr"/>
+            <a:endParaRPr lang="en-CA"/>
+          </a:p>
+        </p:txBody>
+      </p:sp>
+      <p:cxnSp>
+        <p:nvCxnSpPr>
+          <p:cNvPr id="28" name="Straight Connector 27"/>
+          <p:cNvCxnSpPr/>
+          <p:nvPr/>
+        </p:nvCxnSpPr>
+        <p:spPr>
+          <a:xfrm flipH="1" flipV="1">
+            <a:off x="7442318" y="3829305"/>
+            <a:ext cx="634882" cy="1680302"/>
+          </a:xfrm>
+          <a:prstGeom prst="line">
+            <a:avLst/>
+          </a:prstGeom>
+          <a:ln w="19050">
+            <a:solidFill>
+              <a:srgbClr val="F03030"/>
+            </a:solidFill>
+          </a:ln>
+        </p:spPr>
+        <p:style>
+          <a:lnRef idx="1">
+            <a:schemeClr val="accent1"/>
+          </a:lnRef>
+          <a:fillRef idx="0">
+            <a:schemeClr val="accent1"/>
+          </a:fillRef>
+          <a:effectRef idx="0">
+            <a:schemeClr val="accent1"/>
+          </a:effectRef>
+          <a:fontRef idx="minor">
+            <a:schemeClr val="tx1"/>
+          </a:fontRef>
+        </p:style>
+      </p:cxnSp>
+      <p:cxnSp>
+        <p:nvCxnSpPr>
+          <p:cNvPr id="9" name="Elbow Connector 8"/>
+          <p:cNvCxnSpPr/>
+          <p:nvPr/>
+        </p:nvCxnSpPr>
+        <p:spPr>
+          <a:xfrm>
+            <a:off x="2895600" y="3702186"/>
+            <a:ext cx="1792480" cy="377757"/>
+          </a:xfrm>
+          <a:prstGeom prst="bentConnector3">
+            <a:avLst/>
+          </a:prstGeom>
+          <a:ln w="38100">
+            <a:solidFill>
+              <a:srgbClr val="7030A0"/>
+            </a:solidFill>
+            <a:tailEnd type="arrow"/>
+          </a:ln>
+        </p:spPr>
+        <p:style>
+          <a:lnRef idx="1">
+            <a:schemeClr val="accent1"/>
+          </a:lnRef>
+          <a:fillRef idx="0">
+            <a:schemeClr val="accent1"/>
+          </a:fillRef>
+          <a:effectRef idx="0">
+            <a:schemeClr val="accent1"/>
+          </a:effectRef>
+          <a:fontRef idx="minor">
+            <a:schemeClr val="tx1"/>
+          </a:fontRef>
+        </p:style>
+      </p:cxnSp>
+      <p:sp>
+        <p:nvSpPr>
+          <p:cNvPr id="29" name="TextBox 28"/>
+          <p:cNvSpPr txBox="1"/>
+          <p:nvPr/>
+        </p:nvSpPr>
+        <p:spPr>
+          <a:xfrm>
+            <a:off x="6210300" y="5509606"/>
+            <a:ext cx="2819400" cy="1323439"/>
+          </a:xfrm>
+          <a:prstGeom prst="rect">
+            <a:avLst/>
+          </a:prstGeom>
+          <a:solidFill>
+            <a:schemeClr val="tx2">
+              <a:lumMod val="75000"/>
+            </a:schemeClr>
+          </a:solidFill>
+          <a:ln w="19050">
+            <a:solidFill>
+              <a:srgbClr val="F03030"/>
+            </a:solidFill>
+          </a:ln>
+        </p:spPr>
+        <p:txBody>
+          <a:bodyPr wrap="square" rtlCol="0">
+            <a:spAutoFit/>
+          </a:bodyPr>
+          <a:lstStyle/>
+          <a:p>
+            <a:pPr algn="ctr"/>
+            <a:r>
+              <a:rPr lang="en-US" sz="1600" dirty="0" smtClean="0">
+                <a:solidFill>
+                  <a:schemeClr val="bg1"/>
+                </a:solidFill>
+              </a:rPr>
+              <a:t>The ID we need for our </a:t>
+            </a:r>
+            <a:r>
+              <a:rPr lang="en-US" sz="1600" dirty="0" err="1" smtClean="0">
+                <a:solidFill>
+                  <a:schemeClr val="bg1"/>
+                </a:solidFill>
+              </a:rPr>
+              <a:t>keymessage.json</a:t>
+            </a:r>
+            <a:r>
+              <a:rPr lang="en-US" sz="1600" dirty="0" smtClean="0">
+                <a:solidFill>
+                  <a:schemeClr val="bg1"/>
+                </a:solidFill>
+              </a:rPr>
+              <a:t> is the string at the end of the URL. For AbbVie </a:t>
+            </a:r>
+            <a:r>
+              <a:rPr lang="en-US" sz="1600" dirty="0" err="1" smtClean="0">
+                <a:solidFill>
+                  <a:schemeClr val="bg1"/>
+                </a:solidFill>
+              </a:rPr>
+              <a:t>Humira</a:t>
+            </a:r>
+            <a:r>
+              <a:rPr lang="en-US" sz="1600" dirty="0" smtClean="0">
+                <a:solidFill>
+                  <a:schemeClr val="bg1"/>
+                </a:solidFill>
+              </a:rPr>
+              <a:t> Gastro IVA, </a:t>
+            </a:r>
+            <a:r>
+              <a:rPr lang="en-US" sz="1600" dirty="0">
+                <a:solidFill>
+                  <a:schemeClr val="bg1"/>
+                </a:solidFill>
+              </a:rPr>
+              <a:t>the string is “</a:t>
+            </a:r>
+            <a:r>
+              <a:rPr lang="en-US" sz="1600" dirty="0" smtClean="0">
+                <a:solidFill>
+                  <a:schemeClr val="bg1"/>
+                </a:solidFill>
+              </a:rPr>
+              <a:t>a00O000000VGbVA”</a:t>
+            </a:r>
+            <a:endParaRPr lang="en-CA" sz="1600" dirty="0">
+              <a:solidFill>
+                <a:schemeClr val="bg1"/>
+              </a:solidFill>
+            </a:endParaRPr>
+          </a:p>
+        </p:txBody>
+      </p:sp>
+    </p:spTree>
+    <p:extLst>
+      <p:ext uri="{BB962C8B-B14F-4D97-AF65-F5344CB8AC3E}">
+        <p14:creationId xmlns:p14="http://schemas.microsoft.com/office/powerpoint/2010/main" val="1277831276"/>
+      </p:ext>
+    </p:extLst>
+  </p:cSld>
+  <p:clrMapOvr>
+    <a:masterClrMapping/>
+  </p:clrMapOvr>
+  <p:timing>
+    <p:tnLst>
+      <p:par>
+        <p:cTn id="1" dur="indefinite" restart="never" nodeType="tmRoot"/>
+      </p:par>
+    </p:tnLst>
+  </p:timing>
+</p:sld>
+</file>
+
+<file path=ppt/slides/slide7.xml><?xml version="1.0" encoding="utf-8"?>
+<p:sld xmlns:a="http://schemas.openxmlformats.org/drawingml/2006/main" xmlns:r="http://schemas.openxmlformats.org/officeDocument/2006/relationships" xmlns:p="http://schemas.openxmlformats.org/presentationml/2006/main">
+  <p:cSld>
+    <p:spTree>
+      <p:nvGrpSpPr>
+        <p:cNvPr id="1" name=""/>
+        <p:cNvGrpSpPr/>
+        <p:nvPr/>
+      </p:nvGrpSpPr>
+      <p:grpSpPr>
+        <a:xfrm>
+          <a:off x="0" y="0"/>
+          <a:ext cx="0" cy="0"/>
+          <a:chOff x="0" y="0"/>
+          <a:chExt cx="0" cy="0"/>
+        </a:xfrm>
+      </p:grpSpPr>
+      <p:sp>
+        <p:nvSpPr>
+          <p:cNvPr id="7" name="TextBox 6"/>
+          <p:cNvSpPr txBox="1"/>
+          <p:nvPr/>
+        </p:nvSpPr>
+        <p:spPr>
+          <a:xfrm>
+            <a:off x="0" y="-68997"/>
+            <a:ext cx="9144000" cy="830997"/>
+          </a:xfrm>
+          <a:prstGeom prst="rect">
+            <a:avLst/>
+          </a:prstGeom>
+          <a:solidFill>
+            <a:schemeClr val="tx2">
+              <a:lumMod val="75000"/>
+            </a:schemeClr>
+          </a:solidFill>
+        </p:spPr>
+        <p:txBody>
+          <a:bodyPr wrap="square" rtlCol="0">
+            <a:spAutoFit/>
+          </a:bodyPr>
+          <a:lstStyle/>
+          <a:p>
+            <a:pPr algn="ctr"/>
+            <a:r>
+              <a:rPr lang="en-US" sz="4800" dirty="0" err="1" smtClean="0">
+                <a:solidFill>
+                  <a:schemeClr val="bg1"/>
+                </a:solidFill>
+              </a:rPr>
+              <a:t>SalesForce</a:t>
+            </a:r>
+            <a:r>
+              <a:rPr lang="en-US" sz="4800" dirty="0" smtClean="0">
+                <a:solidFill>
+                  <a:schemeClr val="bg1"/>
+                </a:solidFill>
+              </a:rPr>
+              <a:t> – New Product</a:t>
+            </a:r>
+            <a:endParaRPr lang="en-CA" sz="4800" dirty="0">
+              <a:solidFill>
+                <a:schemeClr val="bg1"/>
+              </a:solidFill>
+            </a:endParaRPr>
+          </a:p>
+        </p:txBody>
+      </p:sp>
+      <p:pic>
+        <p:nvPicPr>
+          <p:cNvPr id="3" name="Picture 2"/>
+          <p:cNvPicPr>
+            <a:picLocks noChangeAspect="1"/>
+          </p:cNvPicPr>
+          <p:nvPr/>
+        </p:nvPicPr>
+        <p:blipFill>
+          <a:blip r:embed="rId2">
+            <a:extLst>
+              <a:ext uri="{28A0092B-C50C-407E-A947-70E740481C1C}">
+                <a14:useLocalDpi xmlns:a14="http://schemas.microsoft.com/office/drawing/2010/main" val="0"/>
+              </a:ext>
+            </a:extLst>
+          </a:blip>
+          <a:stretch>
+            <a:fillRect/>
+          </a:stretch>
+        </p:blipFill>
+        <p:spPr>
+          <a:xfrm>
+            <a:off x="-3561" y="685800"/>
+            <a:ext cx="9144000" cy="6172200"/>
+          </a:xfrm>
+          <a:prstGeom prst="rect">
+            <a:avLst/>
+          </a:prstGeom>
+        </p:spPr>
+      </p:pic>
+      <p:sp>
+        <p:nvSpPr>
+          <p:cNvPr id="13" name="Rectangle 12"/>
+          <p:cNvSpPr/>
+          <p:nvPr/>
+        </p:nvSpPr>
+        <p:spPr>
+          <a:xfrm>
+            <a:off x="3124199" y="3187581"/>
+            <a:ext cx="1444239" cy="228600"/>
+          </a:xfrm>
+          <a:prstGeom prst="rect">
+            <a:avLst/>
+          </a:prstGeom>
+          <a:noFill/>
+          <a:ln>
+            <a:solidFill>
+              <a:srgbClr val="FF0000"/>
+            </a:solidFill>
+          </a:ln>
+        </p:spPr>
+        <p:style>
+          <a:lnRef idx="2">
+            <a:schemeClr val="accent1">
+              <a:shade val="50000"/>
+            </a:schemeClr>
+          </a:lnRef>
+          <a:fillRef idx="1">
+            <a:schemeClr val="accent1"/>
+          </a:fillRef>
+          <a:effectRef idx="0">
+            <a:schemeClr val="accent1"/>
+          </a:effectRef>
+          <a:fontRef idx="minor">
+            <a:schemeClr val="lt1"/>
+          </a:fontRef>
+        </p:style>
+        <p:txBody>
+          <a:bodyPr rtlCol="0" anchor="ctr"/>
+          <a:lstStyle/>
+          <a:p>
+            <a:pPr algn="ctr"/>
+            <a:endParaRPr lang="en-CA"/>
+          </a:p>
+        </p:txBody>
+      </p:sp>
+      <p:sp>
+        <p:nvSpPr>
+          <p:cNvPr id="14" name="Rectangle 13"/>
+          <p:cNvSpPr/>
+          <p:nvPr/>
+        </p:nvSpPr>
+        <p:spPr>
+          <a:xfrm>
+            <a:off x="3124200" y="3543300"/>
+            <a:ext cx="1444238" cy="228600"/>
+          </a:xfrm>
+          <a:prstGeom prst="rect">
+            <a:avLst/>
+          </a:prstGeom>
+          <a:noFill/>
+          <a:ln>
+            <a:solidFill>
+              <a:srgbClr val="FF0000"/>
+            </a:solidFill>
+          </a:ln>
+        </p:spPr>
+        <p:style>
+          <a:lnRef idx="2">
+            <a:schemeClr val="accent1">
+              <a:shade val="50000"/>
+            </a:schemeClr>
+          </a:lnRef>
+          <a:fillRef idx="1">
+            <a:schemeClr val="accent1"/>
+          </a:fillRef>
+          <a:effectRef idx="0">
+            <a:schemeClr val="accent1"/>
+          </a:effectRef>
+          <a:fontRef idx="minor">
+            <a:schemeClr val="lt1"/>
+          </a:fontRef>
+        </p:style>
+        <p:txBody>
+          <a:bodyPr rtlCol="0" anchor="ctr"/>
+          <a:lstStyle/>
+          <a:p>
+            <a:pPr algn="ctr"/>
+            <a:endParaRPr lang="en-CA"/>
+          </a:p>
+        </p:txBody>
+      </p:sp>
+      <p:sp>
+        <p:nvSpPr>
+          <p:cNvPr id="15" name="TextBox 14"/>
+          <p:cNvSpPr txBox="1"/>
+          <p:nvPr/>
+        </p:nvSpPr>
+        <p:spPr>
+          <a:xfrm>
+            <a:off x="89019" y="1143000"/>
+            <a:ext cx="3124200" cy="1200329"/>
+          </a:xfrm>
+          <a:prstGeom prst="rect">
+            <a:avLst/>
+          </a:prstGeom>
+          <a:solidFill>
+            <a:schemeClr val="tx2">
+              <a:lumMod val="75000"/>
+            </a:schemeClr>
+          </a:solidFill>
+          <a:ln w="19050">
+            <a:solidFill>
+              <a:srgbClr val="F03030"/>
+            </a:solidFill>
+          </a:ln>
+        </p:spPr>
+        <p:txBody>
+          <a:bodyPr wrap="square" rtlCol="0">
+            <a:spAutoFit/>
+          </a:bodyPr>
+          <a:lstStyle/>
+          <a:p>
+            <a:pPr algn="ctr"/>
+            <a:r>
+              <a:rPr lang="en-US" dirty="0" smtClean="0">
+                <a:solidFill>
+                  <a:schemeClr val="bg1"/>
+                </a:solidFill>
+              </a:rPr>
+              <a:t>To create a new Product, press “New” on the product Catalog page. It will take you to the New Product Catalog page.</a:t>
+            </a:r>
+            <a:endParaRPr lang="en-CA" dirty="0">
+              <a:solidFill>
+                <a:schemeClr val="bg1"/>
+              </a:solidFill>
+            </a:endParaRPr>
+          </a:p>
+        </p:txBody>
+      </p:sp>
+      <p:cxnSp>
+        <p:nvCxnSpPr>
+          <p:cNvPr id="16" name="Straight Connector 15"/>
+          <p:cNvCxnSpPr>
+            <a:stCxn id="21" idx="1"/>
+          </p:cNvCxnSpPr>
+          <p:nvPr/>
+        </p:nvCxnSpPr>
+        <p:spPr>
+          <a:xfrm flipH="1">
+            <a:off x="4579478" y="2978718"/>
+            <a:ext cx="1135522" cy="323163"/>
+          </a:xfrm>
+          <a:prstGeom prst="line">
+            <a:avLst/>
+          </a:prstGeom>
+          <a:ln w="19050">
+            <a:solidFill>
+              <a:srgbClr val="F03030"/>
+            </a:solidFill>
+          </a:ln>
+        </p:spPr>
+        <p:style>
+          <a:lnRef idx="1">
+            <a:schemeClr val="accent1"/>
+          </a:lnRef>
+          <a:fillRef idx="0">
+            <a:schemeClr val="accent1"/>
+          </a:fillRef>
+          <a:effectRef idx="0">
+            <a:schemeClr val="accent1"/>
+          </a:effectRef>
+          <a:fontRef idx="minor">
+            <a:schemeClr val="tx1"/>
+          </a:fontRef>
+        </p:style>
+      </p:cxnSp>
+      <p:sp>
+        <p:nvSpPr>
+          <p:cNvPr id="21" name="TextBox 20"/>
+          <p:cNvSpPr txBox="1"/>
+          <p:nvPr/>
+        </p:nvSpPr>
+        <p:spPr>
+          <a:xfrm>
+            <a:off x="5715000" y="2655552"/>
+            <a:ext cx="2819400" cy="646331"/>
+          </a:xfrm>
+          <a:prstGeom prst="rect">
+            <a:avLst/>
+          </a:prstGeom>
+          <a:solidFill>
+            <a:schemeClr val="tx2">
+              <a:lumMod val="75000"/>
+            </a:schemeClr>
+          </a:solidFill>
+          <a:ln w="19050">
+            <a:solidFill>
+              <a:srgbClr val="F03030"/>
+            </a:solidFill>
+          </a:ln>
+        </p:spPr>
+        <p:txBody>
+          <a:bodyPr wrap="square" rtlCol="0">
+            <a:spAutoFit/>
+          </a:bodyPr>
+          <a:lstStyle/>
+          <a:p>
+            <a:pPr algn="ctr"/>
+            <a:r>
+              <a:rPr lang="en-US" dirty="0" smtClean="0">
+                <a:solidFill>
+                  <a:schemeClr val="bg1"/>
+                </a:solidFill>
+              </a:rPr>
+              <a:t>Enter the name you want to use for the new product</a:t>
+            </a:r>
+            <a:endParaRPr lang="en-CA" dirty="0">
+              <a:solidFill>
+                <a:schemeClr val="bg1"/>
+              </a:solidFill>
+            </a:endParaRPr>
+          </a:p>
+        </p:txBody>
+      </p:sp>
+      <p:sp>
+        <p:nvSpPr>
+          <p:cNvPr id="22" name="TextBox 21"/>
+          <p:cNvSpPr txBox="1"/>
+          <p:nvPr/>
+        </p:nvSpPr>
+        <p:spPr>
+          <a:xfrm>
+            <a:off x="5715000" y="3543300"/>
+            <a:ext cx="2819400" cy="646331"/>
+          </a:xfrm>
+          <a:prstGeom prst="rect">
+            <a:avLst/>
+          </a:prstGeom>
+          <a:solidFill>
+            <a:schemeClr val="tx2">
+              <a:lumMod val="75000"/>
+            </a:schemeClr>
+          </a:solidFill>
+          <a:ln w="19050">
+            <a:solidFill>
+              <a:srgbClr val="F03030"/>
+            </a:solidFill>
+          </a:ln>
+        </p:spPr>
+        <p:txBody>
+          <a:bodyPr wrap="square" rtlCol="0">
+            <a:spAutoFit/>
+          </a:bodyPr>
+          <a:lstStyle/>
+          <a:p>
+            <a:pPr algn="ctr"/>
+            <a:r>
+              <a:rPr lang="en-US" dirty="0" smtClean="0">
+                <a:solidFill>
+                  <a:schemeClr val="bg1"/>
+                </a:solidFill>
+              </a:rPr>
+              <a:t>For ISAs, the Product Type should be set to Detail.</a:t>
+            </a:r>
+            <a:endParaRPr lang="en-CA" dirty="0">
+              <a:solidFill>
+                <a:schemeClr val="bg1"/>
+              </a:solidFill>
+            </a:endParaRPr>
+          </a:p>
+        </p:txBody>
+      </p:sp>
+      <p:cxnSp>
+        <p:nvCxnSpPr>
+          <p:cNvPr id="24" name="Straight Connector 23"/>
+          <p:cNvCxnSpPr/>
+          <p:nvPr/>
+        </p:nvCxnSpPr>
+        <p:spPr>
+          <a:xfrm flipH="1" flipV="1">
+            <a:off x="4579478" y="3650836"/>
+            <a:ext cx="1135522" cy="235364"/>
+          </a:xfrm>
+          <a:prstGeom prst="line">
+            <a:avLst/>
+          </a:prstGeom>
+          <a:ln w="19050">
+            <a:solidFill>
+              <a:srgbClr val="F03030"/>
+            </a:solidFill>
+          </a:ln>
+        </p:spPr>
+        <p:style>
+          <a:lnRef idx="1">
+            <a:schemeClr val="accent1"/>
+          </a:lnRef>
+          <a:fillRef idx="0">
+            <a:schemeClr val="accent1"/>
+          </a:fillRef>
+          <a:effectRef idx="0">
+            <a:schemeClr val="accent1"/>
+          </a:effectRef>
+          <a:fontRef idx="minor">
+            <a:schemeClr val="tx1"/>
+          </a:fontRef>
+        </p:style>
+      </p:cxnSp>
+      <p:sp>
+        <p:nvSpPr>
+          <p:cNvPr id="25" name="TextBox 24"/>
+          <p:cNvSpPr txBox="1"/>
+          <p:nvPr/>
+        </p:nvSpPr>
+        <p:spPr>
+          <a:xfrm>
+            <a:off x="-3561" y="4457343"/>
+            <a:ext cx="9140439" cy="2400657"/>
+          </a:xfrm>
+          <a:prstGeom prst="rect">
+            <a:avLst/>
+          </a:prstGeom>
+          <a:solidFill>
+            <a:schemeClr val="tx2">
+              <a:lumMod val="75000"/>
+            </a:schemeClr>
+          </a:solidFill>
+          <a:ln w="19050">
+            <a:solidFill>
+              <a:srgbClr val="F03030"/>
+            </a:solidFill>
+          </a:ln>
+        </p:spPr>
+        <p:txBody>
+          <a:bodyPr wrap="square" lIns="548640" tIns="91440" rIns="548640" bIns="91440" rtlCol="0">
+            <a:spAutoFit/>
+          </a:bodyPr>
+          <a:lstStyle/>
+          <a:p>
+            <a:pPr algn="ctr"/>
+            <a:r>
+              <a:rPr lang="en-US" dirty="0" smtClean="0">
+                <a:solidFill>
+                  <a:schemeClr val="bg1"/>
+                </a:solidFill>
+              </a:rPr>
+              <a:t>Only the 2 fields need to be completed to create a valid product.</a:t>
+            </a:r>
+          </a:p>
+          <a:p>
+            <a:pPr algn="ctr"/>
+            <a:endParaRPr lang="en-US" dirty="0">
+              <a:solidFill>
+                <a:schemeClr val="bg1"/>
+              </a:solidFill>
+            </a:endParaRPr>
+          </a:p>
+          <a:p>
+            <a:pPr algn="ctr"/>
+            <a:r>
+              <a:rPr lang="en-US" dirty="0" smtClean="0">
+                <a:solidFill>
+                  <a:schemeClr val="bg1"/>
+                </a:solidFill>
+              </a:rPr>
+              <a:t>When you hit save, it will take you to the product page for your new product, where you can grab the ID from the URL</a:t>
+            </a:r>
+          </a:p>
+          <a:p>
+            <a:pPr algn="ctr"/>
+            <a:endParaRPr lang="en-US" dirty="0">
+              <a:solidFill>
+                <a:schemeClr val="bg1"/>
+              </a:solidFill>
+            </a:endParaRPr>
+          </a:p>
+          <a:p>
+            <a:pPr algn="ctr"/>
+            <a:r>
+              <a:rPr lang="en-US" dirty="0" smtClean="0">
+                <a:solidFill>
+                  <a:schemeClr val="bg1"/>
+                </a:solidFill>
+              </a:rPr>
+              <a:t>You will need to get your new product setup with an account for syncing to </a:t>
+            </a:r>
+            <a:r>
+              <a:rPr lang="en-US" dirty="0" err="1" smtClean="0">
+                <a:solidFill>
+                  <a:schemeClr val="bg1"/>
+                </a:solidFill>
+              </a:rPr>
+              <a:t>Veeva</a:t>
+            </a:r>
+            <a:r>
+              <a:rPr lang="en-US" dirty="0" smtClean="0">
+                <a:solidFill>
+                  <a:schemeClr val="bg1"/>
+                </a:solidFill>
+              </a:rPr>
+              <a:t>. Let the </a:t>
+            </a:r>
+            <a:r>
+              <a:rPr lang="en-US" b="1" dirty="0" smtClean="0">
+                <a:solidFill>
+                  <a:schemeClr val="bg1"/>
+                </a:solidFill>
+              </a:rPr>
+              <a:t>CRM team </a:t>
+            </a:r>
+            <a:r>
+              <a:rPr lang="en-US" dirty="0" smtClean="0">
+                <a:solidFill>
+                  <a:schemeClr val="bg1"/>
+                </a:solidFill>
+              </a:rPr>
+              <a:t>know which product and which login you are using, and they can create the association for you.</a:t>
+            </a:r>
+            <a:endParaRPr lang="en-CA" dirty="0">
+              <a:solidFill>
+                <a:schemeClr val="bg1"/>
+              </a:solidFill>
+            </a:endParaRPr>
+          </a:p>
+        </p:txBody>
+      </p:sp>
+    </p:spTree>
+    <p:extLst>
+      <p:ext uri="{BB962C8B-B14F-4D97-AF65-F5344CB8AC3E}">
+        <p14:creationId xmlns:p14="http://schemas.microsoft.com/office/powerpoint/2010/main" val="274877815"/>
       </p:ext>
     </p:extLst>
   </p:cSld>

</xml_diff>